<commit_message>
KUGODS week 6 revised
</commit_message>
<xml_diff>
--- a/KUGODS Junior Algorithm study/정규세션 알고리즘 6주차.pptx
+++ b/KUGODS Junior Algorithm study/정규세션 알고리즘 6주차.pptx
@@ -230,7 +230,7 @@
           <a:p>
             <a:fld id="{BA464F65-D7CD-E542-8396-8B51408E64CA}" type="datetimeFigureOut">
               <a:rPr kumimoji="1" lang="ko-Kore-KR" altLang="en-US" smtClean="0"/>
-              <a:t>2022. 11. 22.</a:t>
+              <a:t>2022. 11. 29.</a:t>
             </a:fld>
             <a:endParaRPr kumimoji="1" lang="ko-Kore-KR" altLang="en-US"/>
           </a:p>
@@ -407,7 +407,7 @@
           <a:p>
             <a:fld id="{2EE59314-3B37-F245-9B8F-A2A1C0353C67}" type="datetimeFigureOut">
               <a:rPr kumimoji="1" lang="ko-Kore-KR" altLang="en-US" smtClean="0"/>
-              <a:t>2022. 11. 22.</a:t>
+              <a:t>2022. 11. 29.</a:t>
             </a:fld>
             <a:endParaRPr kumimoji="1" lang="ko-Kore-KR" altLang="en-US"/>
           </a:p>
@@ -2014,7 +2014,7 @@
           <a:p>
             <a:fld id="{09EBD7DB-1E76-534E-8822-F10881A41233}" type="datetimeFigureOut">
               <a:rPr kumimoji="1" lang="ko-Kore-KR" altLang="en-US" smtClean="0"/>
-              <a:t>2022. 11. 22.</a:t>
+              <a:t>2022. 11. 29.</a:t>
             </a:fld>
             <a:endParaRPr kumimoji="1" lang="ko-Kore-KR" altLang="en-US"/>
           </a:p>
@@ -2254,7 +2254,7 @@
           <a:p>
             <a:fld id="{09EBD7DB-1E76-534E-8822-F10881A41233}" type="datetimeFigureOut">
               <a:rPr kumimoji="1" lang="ko-Kore-KR" altLang="en-US" smtClean="0"/>
-              <a:t>2022. 11. 22.</a:t>
+              <a:t>2022. 11. 29.</a:t>
             </a:fld>
             <a:endParaRPr kumimoji="1" lang="ko-Kore-KR" altLang="en-US"/>
           </a:p>
@@ -2494,7 +2494,7 @@
           <a:p>
             <a:fld id="{09EBD7DB-1E76-534E-8822-F10881A41233}" type="datetimeFigureOut">
               <a:rPr kumimoji="1" lang="ko-Kore-KR" altLang="en-US" smtClean="0"/>
-              <a:t>2022. 11. 22.</a:t>
+              <a:t>2022. 11. 29.</a:t>
             </a:fld>
             <a:endParaRPr kumimoji="1" lang="ko-Kore-KR" altLang="en-US"/>
           </a:p>
@@ -2934,7 +2934,7 @@
           <a:p>
             <a:fld id="{09EBD7DB-1E76-534E-8822-F10881A41233}" type="datetimeFigureOut">
               <a:rPr kumimoji="1" lang="ko-Kore-KR" altLang="en-US" smtClean="0"/>
-              <a:t>2022. 11. 22.</a:t>
+              <a:t>2022. 11. 29.</a:t>
             </a:fld>
             <a:endParaRPr kumimoji="1" lang="ko-Kore-KR" altLang="en-US"/>
           </a:p>
@@ -3240,7 +3240,7 @@
           <a:p>
             <a:fld id="{09EBD7DB-1E76-534E-8822-F10881A41233}" type="datetimeFigureOut">
               <a:rPr kumimoji="1" lang="ko-Kore-KR" altLang="en-US" smtClean="0"/>
-              <a:t>2022. 11. 22.</a:t>
+              <a:t>2022. 11. 29.</a:t>
             </a:fld>
             <a:endParaRPr kumimoji="1" lang="ko-Kore-KR" altLang="en-US"/>
           </a:p>
@@ -3694,7 +3694,7 @@
           <a:p>
             <a:fld id="{09EBD7DB-1E76-534E-8822-F10881A41233}" type="datetimeFigureOut">
               <a:rPr kumimoji="1" lang="ko-Kore-KR" altLang="en-US" smtClean="0"/>
-              <a:t>2022. 11. 22.</a:t>
+              <a:t>2022. 11. 29.</a:t>
             </a:fld>
             <a:endParaRPr kumimoji="1" lang="ko-Kore-KR" altLang="en-US"/>
           </a:p>
@@ -3868,7 +3868,7 @@
           <a:p>
             <a:fld id="{09EBD7DB-1E76-534E-8822-F10881A41233}" type="datetimeFigureOut">
               <a:rPr kumimoji="1" lang="ko-Kore-KR" altLang="en-US" smtClean="0"/>
-              <a:t>2022. 11. 22.</a:t>
+              <a:t>2022. 11. 29.</a:t>
             </a:fld>
             <a:endParaRPr kumimoji="1" lang="ko-Kore-KR" altLang="en-US"/>
           </a:p>
@@ -4005,7 +4005,7 @@
           <a:p>
             <a:fld id="{09EBD7DB-1E76-534E-8822-F10881A41233}" type="datetimeFigureOut">
               <a:rPr kumimoji="1" lang="ko-Kore-KR" altLang="en-US" smtClean="0"/>
-              <a:t>2022. 11. 22.</a:t>
+              <a:t>2022. 11. 29.</a:t>
             </a:fld>
             <a:endParaRPr kumimoji="1" lang="ko-Kore-KR" altLang="en-US"/>
           </a:p>
@@ -4351,7 +4351,7 @@
           <a:p>
             <a:fld id="{09EBD7DB-1E76-534E-8822-F10881A41233}" type="datetimeFigureOut">
               <a:rPr kumimoji="1" lang="ko-Kore-KR" altLang="en-US" smtClean="0"/>
-              <a:t>2022. 11. 22.</a:t>
+              <a:t>2022. 11. 29.</a:t>
             </a:fld>
             <a:endParaRPr kumimoji="1" lang="ko-Kore-KR" altLang="en-US"/>
           </a:p>
@@ -4673,7 +4673,7 @@
           <a:p>
             <a:fld id="{09EBD7DB-1E76-534E-8822-F10881A41233}" type="datetimeFigureOut">
               <a:rPr kumimoji="1" lang="ko-Kore-KR" altLang="en-US" smtClean="0"/>
-              <a:t>2022. 11. 22.</a:t>
+              <a:t>2022. 11. 29.</a:t>
             </a:fld>
             <a:endParaRPr kumimoji="1" lang="ko-Kore-KR" altLang="en-US"/>
           </a:p>
@@ -11739,7 +11739,7 @@
               <a:t> </a:t>
             </a:r>
             <a:r>
-              <a:rPr kumimoji="1" lang="en-US" altLang="ko-KR" sz="2400" b="1" dirty="0" err="1">
+              <a:rPr kumimoji="1" lang="en-US" altLang="ko-KR" sz="2400" b="1" dirty="0">
                 <a:solidFill>
                   <a:schemeClr val="bg2">
                     <a:lumMod val="50000"/>
@@ -11748,7 +11748,7 @@
                 <a:latin typeface="NanumSquareOTF_ac ExtraBold" panose="020B0600000101010101" pitchFamily="34" charset="-127"/>
                 <a:ea typeface="NanumSquareOTF_ac ExtraBold" panose="020B0600000101010101" pitchFamily="34" charset="-127"/>
               </a:rPr>
-              <a:t>Dinamic</a:t>
+              <a:t>Dynamic</a:t>
             </a:r>
             <a:r>
               <a:rPr kumimoji="1" lang="ko-KR" altLang="en-US" sz="2400" b="1" dirty="0">

</xml_diff>